<commit_message>
Update 2026-02-12 report (Notion投稿対応)
</commit_message>
<xml_diff>
--- a/2026-02-12/report.pptx
+++ b/2026-02-12/report.pptx
@@ -5684,7 +5684,7 @@
               </a:defRPr>
             </a:pPr>
             <a:r>
-              <a:t>► LLM Stats: https://llm-stats.com/llm-updates</a:t>
+              <a:t>► ビジネス+IT: https://www.sbbit.jp/article/cont1/178534</a:t>
             </a:r>
           </a:p>
           <a:p>
@@ -5700,7 +5700,7 @@
               </a:defRPr>
             </a:pPr>
             <a:r>
-              <a:t>► Bloomberg Japan: https://www.bloomberg.com/jp/news/articles/2026-02-05/T9ZQOIKGZAQG00</a:t>
+              <a:t>► LM Council: https://lmcouncil.ai/benchmarks</a:t>
             </a:r>
           </a:p>
           <a:p>
@@ -5716,7 +5716,7 @@
               </a:defRPr>
             </a:pPr>
             <a:r>
-              <a:t>► Axios: https://www.axios.com/2026/02/06/amazon-microsoft-meta-ai-investment</a:t>
+              <a:t>► LLM Stats: https://llm-stats.com/ai-trends</a:t>
             </a:r>
           </a:p>
           <a:p>
@@ -5732,7 +5732,7 @@
               </a:defRPr>
             </a:pPr>
             <a:r>
-              <a:t>► Shakudo: https://www.shakudo.io/blog/top-9-large-language-models</a:t>
+              <a:t>► LLM Stats: https://llm-stats.com/llm-updates</a:t>
             </a:r>
           </a:p>
           <a:p>
@@ -5748,7 +5748,7 @@
               </a:defRPr>
             </a:pPr>
             <a:r>
-              <a:t>► Bloomberg: https://www.bloomberg.com/news/articles/2026-02-11/vcs-rush-to-back-rivals-openai-and-anthropic-as-ai-frenzy-mounts</a:t>
+              <a:t>► Bloomberg Japan: https://www.bloomberg.com/jp/news/articles/2026-02-05/T9ZQOIKGZAQG00</a:t>
             </a:r>
           </a:p>
           <a:p>
@@ -5764,7 +5764,7 @@
               </a:defRPr>
             </a:pPr>
             <a:r>
-              <a:t>► ビジネス+IT: https://www.sbbit.jp/article/cont1/178534</a:t>
+              <a:t>► Shakudo: https://www.shakudo.io/blog/top-9-large-language-models</a:t>
             </a:r>
           </a:p>
         </p:txBody>
@@ -5813,7 +5813,7 @@
               </a:defRPr>
             </a:pPr>
             <a:r>
-              <a:t>► LM Council: https://lmcouncil.ai/benchmarks</a:t>
+              <a:t>► NVIDIA Newsroom: https://nvidianews.nvidia.com/news/openai-and-nvidia-announce-strategic-partnership-to-deploy-10gw-of-nvidia-systems</a:t>
             </a:r>
           </a:p>
           <a:p>
@@ -5829,7 +5829,7 @@
               </a:defRPr>
             </a:pPr>
             <a:r>
-              <a:t>► Crunchbase News: https://news.crunchbase.com/robotics/ai-funding-high-figure-raise-data/</a:t>
+              <a:t>► CNN Business: https://edition.cnn.com/2026/02/11/business/openai-anthropic-departures-nightcap</a:t>
             </a:r>
           </a:p>
           <a:p>
@@ -5845,7 +5845,7 @@
               </a:defRPr>
             </a:pPr>
             <a:r>
-              <a:t>► LLM Stats: https://llm-stats.com/ai-trends</a:t>
+              <a:t>► Bloomberg: https://www.bloomberg.com/news/articles/2026-02-11/vcs-rush-to-back-rivals-openai-and-anthropic-as-ai-frenzy-mounts</a:t>
             </a:r>
           </a:p>
           <a:p>
@@ -5861,7 +5861,7 @@
               </a:defRPr>
             </a:pPr>
             <a:r>
-              <a:t>► NVIDIA Newsroom: https://nvidianews.nvidia.com/news/openai-and-nvidia-announce-strategic-partnership-to-deploy-10gw-of-nvidia-systems</a:t>
+              <a:t>► Crunchbase News: https://news.crunchbase.com/robotics/ai-funding-high-figure-raise-data/</a:t>
             </a:r>
           </a:p>
           <a:p>
@@ -5877,7 +5877,7 @@
               </a:defRPr>
             </a:pPr>
             <a:r>
-              <a:t>► CNN Business: https://edition.cnn.com/2026/02/11/business/openai-anthropic-departures-nightcap</a:t>
+              <a:t>► TechCrunch: https://techcrunch.com/2026/02/11/xai-lays-out-interplanetary-ambitions-in-public-all-hands/</a:t>
             </a:r>
           </a:p>
           <a:p>
@@ -5893,7 +5893,7 @@
               </a:defRPr>
             </a:pPr>
             <a:r>
-              <a:t>► TechCrunch: https://techcrunch.com/2026/02/11/xai-lays-out-interplanetary-ambitions-in-public-all-hands/</a:t>
+              <a:t>► Axios: https://www.axios.com/2026/02/06/amazon-microsoft-meta-ai-investment</a:t>
             </a:r>
           </a:p>
         </p:txBody>

</xml_diff>